<commit_message>
Remove Field gateway, add simpler IoT device
</commit_message>
<xml_diff>
--- a/Lab1/WeatherStationArchitecture-2CD4FC8F.pptx
+++ b/Lab1/WeatherStationArchitecture-2CD4FC8F.pptx
@@ -835,8 +835,8 @@
         </p:nvSpPr>
         <p:spPr>
           <a:xfrm>
-            <a:off x="381300" y="685800"/>
-            <a:ext cx="6096075" cy="3429000"/>
+            <a:off x="381000" y="685800"/>
+            <a:ext cx="6096000" cy="3429000"/>
           </a:xfrm>
           <a:custGeom>
             <a:avLst/>
@@ -5953,34 +5953,6 @@
           <a:chExt cx="0" cy="0"/>
         </a:xfrm>
       </p:grpSpPr>
-      <p:pic>
-        <p:nvPicPr>
-          <p:cNvPr id="60" name="Google Shape;60;p14"/>
-          <p:cNvPicPr preferRelativeResize="0"/>
-          <p:nvPr/>
-        </p:nvPicPr>
-        <p:blipFill>
-          <a:blip r:embed="rId3">
-            <a:alphaModFix/>
-          </a:blip>
-          <a:stretch>
-            <a:fillRect/>
-          </a:stretch>
-        </p:blipFill>
-        <p:spPr>
-          <a:xfrm>
-            <a:off x="1615425" y="533226"/>
-            <a:ext cx="5925675" cy="4387700"/>
-          </a:xfrm>
-          <a:prstGeom prst="rect">
-            <a:avLst/>
-          </a:prstGeom>
-          <a:noFill/>
-          <a:ln>
-            <a:noFill/>
-          </a:ln>
-        </p:spPr>
-      </p:pic>
       <p:sp>
         <p:nvSpPr>
           <p:cNvPr id="61" name="Google Shape;61;p14"/>
@@ -6023,6 +5995,36 @@
           </a:p>
         </p:txBody>
       </p:sp>
+      <p:pic>
+        <p:nvPicPr>
+          <p:cNvPr id="2" name="Picture 2" descr="A screenshot of a map&#10;&#10;Description generated with high confidence">
+            <a:extLst>
+              <a:ext uri="{FF2B5EF4-FFF2-40B4-BE49-F238E27FC236}">
+                <a16:creationId xmlns:a16="http://schemas.microsoft.com/office/drawing/2014/main" id="{7DB58B89-3423-49BA-9196-939DEAE0DB6E}"/>
+              </a:ext>
+            </a:extLst>
+          </p:cNvPr>
+          <p:cNvPicPr>
+            <a:picLocks noChangeAspect="1"/>
+          </p:cNvPicPr>
+          <p:nvPr/>
+        </p:nvPicPr>
+        <p:blipFill>
+          <a:blip r:embed="rId3"/>
+          <a:stretch>
+            <a:fillRect/>
+          </a:stretch>
+        </p:blipFill>
+        <p:spPr>
+          <a:xfrm>
+            <a:off x="1644162" y="507285"/>
+            <a:ext cx="6005145" cy="4445454"/>
+          </a:xfrm>
+          <a:prstGeom prst="rect">
+            <a:avLst/>
+          </a:prstGeom>
+        </p:spPr>
+      </p:pic>
     </p:spTree>
   </p:cSld>
   <p:clrMapOvr>
@@ -6115,16 +6117,10 @@
           </a:bodyPr>
           <a:lstStyle/>
           <a:p>
-            <a:pPr marL="457200" lvl="0" indent="-317500" algn="l" rtl="0">
+            <a:pPr indent="-317500">
               <a:lnSpc>
                 <a:spcPct val="100000"/>
               </a:lnSpc>
-              <a:spcBef>
-                <a:spcPts val="0"/>
-              </a:spcBef>
-              <a:spcAft>
-                <a:spcPts val="0"/>
-              </a:spcAft>
               <a:buClr>
                 <a:schemeClr val="dk1"/>
               </a:buClr>
@@ -6132,14 +6128,14 @@
               <a:buChar char="-"/>
             </a:pPr>
             <a:r>
-              <a:rPr lang="en" sz="1400" dirty="0">
+              <a:rPr lang="en" sz="1400">
                 <a:solidFill>
                   <a:schemeClr val="dk1"/>
                 </a:solidFill>
               </a:rPr>
-              <a:t>Field Gateway to read sensor data and communicate with the cloud</a:t>
+              <a:t>IoT Device to read sensor data and communicate with the cloud</a:t>
             </a:r>
-            <a:endParaRPr sz="1400" dirty="0">
+            <a:endParaRPr sz="1400">
               <a:solidFill>
                 <a:schemeClr val="dk1"/>
               </a:solidFill>
@@ -6415,54 +6411,52 @@
           </a:bodyPr>
           <a:lstStyle/>
           <a:p>
-            <a:pPr marL="0" lvl="0" indent="0" algn="l" rtl="0">
-              <a:spcBef>
-                <a:spcPts val="0"/>
-              </a:spcBef>
-              <a:spcAft>
-                <a:spcPts val="0"/>
-              </a:spcAft>
+            <a:pPr marL="0" indent="0">
               <a:buNone/>
             </a:pPr>
             <a:r>
-              <a:rPr lang="en" dirty="0"/>
+              <a:rPr lang="en"/>
               <a:t>Other subsystems omitted from the Proof of Value architecture:</a:t>
             </a:r>
-            <a:endParaRPr dirty="0"/>
+            <a:endParaRPr lang="en-US" dirty="0"/>
           </a:p>
           <a:p>
-            <a:pPr marL="457200" lvl="0" indent="-342900" algn="l" rtl="0">
-              <a:spcBef>
-                <a:spcPts val="1600"/>
-              </a:spcBef>
-              <a:spcAft>
-                <a:spcPts val="0"/>
-              </a:spcAft>
-              <a:buSzPts val="1800"/>
-              <a:buChar char="-"/>
+            <a:pPr marL="0" indent="0">
+              <a:lnSpc>
+                <a:spcPct val="114999"/>
+              </a:lnSpc>
+              <a:buNone/>
             </a:pPr>
             <a:r>
-              <a:rPr lang="en" dirty="0"/>
-              <a:t>UI and Reporting</a:t>
+              <a:rPr lang="en"/>
+              <a:t>- User Management</a:t>
             </a:r>
-            <a:endParaRPr dirty="0"/>
           </a:p>
           <a:p>
-            <a:pPr marL="457200" lvl="0" indent="-342900" algn="l" rtl="0">
-              <a:spcBef>
-                <a:spcPts val="0"/>
-              </a:spcBef>
-              <a:spcAft>
-                <a:spcPts val="0"/>
-              </a:spcAft>
-              <a:buSzPts val="1800"/>
-              <a:buChar char="-"/>
+            <a:pPr marL="0" indent="0">
+              <a:lnSpc>
+                <a:spcPct val="114999"/>
+              </a:lnSpc>
+              <a:buNone/>
             </a:pPr>
             <a:r>
-              <a:rPr lang="en" dirty="0"/>
-              <a:t>User Management</a:t>
+              <a:rPr lang="en"/>
+              <a:t>- UI and Reporting</a:t>
             </a:r>
-            <a:endParaRPr dirty="0"/>
+            <a:endParaRPr lang="en-US"/>
+          </a:p>
+          <a:p>
+            <a:pPr marL="0" indent="0">
+              <a:lnSpc>
+                <a:spcPct val="114999"/>
+              </a:lnSpc>
+              <a:buNone/>
+            </a:pPr>
+            <a:r>
+              <a:rPr lang="en"/>
+              <a:t>- Field Gateway</a:t>
+            </a:r>
+            <a:endParaRPr lang="en-US"/>
           </a:p>
           <a:p>
             <a:pPr marL="0" indent="0">
@@ -6476,30 +6470,59 @@
               <a:t>For the </a:t>
             </a:r>
             <a:r>
-              <a:rPr lang="en" dirty="0" err="1"/>
+              <a:rPr lang="en" err="1"/>
               <a:t>PoV</a:t>
             </a:r>
             <a:r>
               <a:rPr lang="en" dirty="0"/>
-              <a:t> phase all data access will use the warm or cold data stores directly.  Future user management will be built with Azure Active Directory.  </a:t>
+              <a:t> phase all data access will use the warm or cold data stores </a:t>
             </a:r>
-            <a:endParaRPr dirty="0"/>
+            <a:r>
+              <a:rPr lang="en"/>
+              <a:t>directly.  Future user management will be built with Azure Active Directory.  </a:t>
+            </a:r>
           </a:p>
           <a:p>
-            <a:pPr marL="0" lvl="0" indent="0" algn="l" rtl="0">
+            <a:pPr marL="0" indent="0">
+              <a:lnSpc>
+                <a:spcPct val="114999"/>
+              </a:lnSpc>
               <a:spcBef>
                 <a:spcPts val="1600"/>
               </a:spcBef>
-              <a:spcAft>
-                <a:spcPts val="1600"/>
-              </a:spcAft>
               <a:buNone/>
             </a:pPr>
             <a:r>
-              <a:rPr lang="en" dirty="0"/>
+              <a:rPr lang="en"/>
               <a:t>UI and Reporting could be added in a future phase.</a:t>
             </a:r>
-            <a:endParaRPr dirty="0"/>
+          </a:p>
+          <a:p>
+            <a:pPr marL="0" indent="0">
+              <a:lnSpc>
+                <a:spcPct val="114999"/>
+              </a:lnSpc>
+              <a:spcBef>
+                <a:spcPts val="1600"/>
+              </a:spcBef>
+              <a:buNone/>
+            </a:pPr>
+            <a:r>
+              <a:rPr lang="en"/>
+              <a:t>A field gateway will be needed for more complex edge scenarios.</a:t>
+            </a:r>
+          </a:p>
+          <a:p>
+            <a:pPr marL="0" indent="0">
+              <a:lnSpc>
+                <a:spcPct val="114999"/>
+              </a:lnSpc>
+              <a:spcBef>
+                <a:spcPts val="1600"/>
+              </a:spcBef>
+              <a:buNone/>
+            </a:pPr>
+            <a:endParaRPr lang="en" dirty="0"/>
           </a:p>
         </p:txBody>
       </p:sp>

</xml_diff>